<commit_message>
Change nots & presentation
</commit_message>
<xml_diff>
--- a/docs/presentation.pptx
+++ b/docs/presentation.pptx
@@ -113,6 +113,11 @@
       </a:defRPr>
     </a:lvl9pPr>
   </p:defaultTextStyle>
+  <p:extLst>
+    <p:ext uri="{EFAFB233-063F-42B5-8137-9DF3F51BA10A}">
+      <p15:sldGuideLst xmlns:p15="http://schemas.microsoft.com/office/powerpoint/2012/main"/>
+    </p:ext>
+  </p:extLst>
 </p:presentation>
 </file>
 
@@ -342,7 +347,7 @@
           <a:p>
             <a:fld id="{C8C629E9-CAEB-4DDC-8CB9-529EEFE32481}" type="datetimeFigureOut">
               <a:rPr lang="bg-BG" smtClean="0"/>
-              <a:t>25.5.2016 г.</a:t>
+              <a:t>27.5.2016 г.</a:t>
             </a:fld>
             <a:endParaRPr lang="bg-BG"/>
           </a:p>
@@ -550,7 +555,7 @@
           <a:p>
             <a:fld id="{C8C629E9-CAEB-4DDC-8CB9-529EEFE32481}" type="datetimeFigureOut">
               <a:rPr lang="bg-BG" smtClean="0"/>
-              <a:t>25.5.2016 г.</a:t>
+              <a:t>27.5.2016 г.</a:t>
             </a:fld>
             <a:endParaRPr lang="bg-BG"/>
           </a:p>
@@ -806,7 +811,7 @@
           <a:p>
             <a:fld id="{C8C629E9-CAEB-4DDC-8CB9-529EEFE32481}" type="datetimeFigureOut">
               <a:rPr lang="bg-BG" smtClean="0"/>
-              <a:t>25.5.2016 г.</a:t>
+              <a:t>27.5.2016 г.</a:t>
             </a:fld>
             <a:endParaRPr lang="bg-BG"/>
           </a:p>
@@ -980,7 +985,7 @@
           <a:p>
             <a:fld id="{C8C629E9-CAEB-4DDC-8CB9-529EEFE32481}" type="datetimeFigureOut">
               <a:rPr lang="bg-BG" smtClean="0"/>
-              <a:t>25.5.2016 г.</a:t>
+              <a:t>27.5.2016 г.</a:t>
             </a:fld>
             <a:endParaRPr lang="bg-BG"/>
           </a:p>
@@ -1323,7 +1328,7 @@
           <a:p>
             <a:fld id="{C8C629E9-CAEB-4DDC-8CB9-529EEFE32481}" type="datetimeFigureOut">
               <a:rPr lang="bg-BG" smtClean="0"/>
-              <a:t>25.5.2016 г.</a:t>
+              <a:t>27.5.2016 г.</a:t>
             </a:fld>
             <a:endParaRPr lang="bg-BG"/>
           </a:p>
@@ -1598,7 +1603,7 @@
           <a:p>
             <a:fld id="{C8C629E9-CAEB-4DDC-8CB9-529EEFE32481}" type="datetimeFigureOut">
               <a:rPr lang="bg-BG" smtClean="0"/>
-              <a:t>25.5.2016 г.</a:t>
+              <a:t>27.5.2016 г.</a:t>
             </a:fld>
             <a:endParaRPr lang="bg-BG"/>
           </a:p>
@@ -1977,7 +1982,7 @@
           <a:p>
             <a:fld id="{C8C629E9-CAEB-4DDC-8CB9-529EEFE32481}" type="datetimeFigureOut">
               <a:rPr lang="bg-BG" smtClean="0"/>
-              <a:t>25.5.2016 г.</a:t>
+              <a:t>27.5.2016 г.</a:t>
             </a:fld>
             <a:endParaRPr lang="bg-BG"/>
           </a:p>
@@ -2095,7 +2100,7 @@
           <a:p>
             <a:fld id="{C8C629E9-CAEB-4DDC-8CB9-529EEFE32481}" type="datetimeFigureOut">
               <a:rPr lang="bg-BG" smtClean="0"/>
-              <a:t>25.5.2016 г.</a:t>
+              <a:t>27.5.2016 г.</a:t>
             </a:fld>
             <a:endParaRPr lang="bg-BG"/>
           </a:p>
@@ -2266,7 +2271,7 @@
           <a:p>
             <a:fld id="{C8C629E9-CAEB-4DDC-8CB9-529EEFE32481}" type="datetimeFigureOut">
               <a:rPr lang="bg-BG" smtClean="0"/>
-              <a:t>25.5.2016 г.</a:t>
+              <a:t>27.5.2016 г.</a:t>
             </a:fld>
             <a:endParaRPr lang="bg-BG"/>
           </a:p>
@@ -2620,7 +2625,7 @@
           <a:p>
             <a:fld id="{C8C629E9-CAEB-4DDC-8CB9-529EEFE32481}" type="datetimeFigureOut">
               <a:rPr lang="bg-BG" smtClean="0"/>
-              <a:t>25.5.2016 г.</a:t>
+              <a:t>27.5.2016 г.</a:t>
             </a:fld>
             <a:endParaRPr lang="bg-BG"/>
           </a:p>
@@ -3002,7 +3007,7 @@
           <a:p>
             <a:fld id="{C8C629E9-CAEB-4DDC-8CB9-529EEFE32481}" type="datetimeFigureOut">
               <a:rPr lang="bg-BG" smtClean="0"/>
-              <a:t>25.5.2016 г.</a:t>
+              <a:t>27.5.2016 г.</a:t>
             </a:fld>
             <a:endParaRPr lang="bg-BG"/>
           </a:p>
@@ -3289,7 +3294,7 @@
           <a:p>
             <a:fld id="{C8C629E9-CAEB-4DDC-8CB9-529EEFE32481}" type="datetimeFigureOut">
               <a:rPr lang="bg-BG" smtClean="0"/>
-              <a:t>25.5.2016 г.</a:t>
+              <a:t>27.5.2016 г.</a:t>
             </a:fld>
             <a:endParaRPr lang="bg-BG"/>
           </a:p>
@@ -5302,7 +5307,7 @@
           <p:nvPr>
             <p:extLst>
               <p:ext uri="{D42A27DB-BD31-4B8C-83A1-F6EECF244321}">
-                <p14:modId xmlns:p14="http://schemas.microsoft.com/office/powerpoint/2010/main" val="1233472183"/>
+                <p14:modId xmlns:p14="http://schemas.microsoft.com/office/powerpoint/2010/main" val="875465215"/>
               </p:ext>
             </p:extLst>
           </p:nvPr>
@@ -5664,8 +5669,13 @@
                       <a:pPr algn="ctr"/>
                       <a:r>
                         <a:rPr lang="bg-BG" sz="2000" dirty="0"/>
-                        <a:t>1.29576</a:t>
+                        <a:t>1.2</a:t>
                       </a:r>
+                      <a:r>
+                        <a:rPr lang="en-US" sz="2000" dirty="0"/>
+                        <a:t>7863</a:t>
+                      </a:r>
+                      <a:endParaRPr lang="bg-BG" sz="2000" dirty="0"/>
                     </a:p>
                   </a:txBody>
                   <a:tcPr/>
@@ -5714,8 +5724,13 @@
                       <a:pPr algn="ctr"/>
                       <a:r>
                         <a:rPr lang="bg-BG" sz="2000" b="1" dirty="0"/>
-                        <a:t>1.28620</a:t>
+                        <a:t>1.2</a:t>
                       </a:r>
+                      <a:r>
+                        <a:rPr lang="en-US" sz="2000" b="1" dirty="0"/>
+                        <a:t>7375</a:t>
+                      </a:r>
+                      <a:endParaRPr lang="bg-BG" sz="2000" b="1" dirty="0"/>
                     </a:p>
                   </a:txBody>
                   <a:tcPr/>

</xml_diff>